<commit_message>
se agrega array con datos de los proyectos. se da estilo a seccion de proyecto. se hacen cambios en el maquetado de la seccion. se genera funcion para renderizado dinamico de las cards
</commit_message>
<xml_diff>
--- a/Maquetado portfolio.pptx
+++ b/Maquetado portfolio.pptx
@@ -6,7 +6,7 @@
   </p:sldMasterIdLst>
   <p:sldIdLst>
     <p:sldId id="256" r:id="rId2"/>
-    <p:sldId id="257" r:id="rId3"/>
+    <p:sldId id="258" r:id="rId3"/>
   </p:sldIdLst>
   <p:sldSz cx="12192000" cy="6858000"/>
   <p:notesSz cx="6858000" cy="9144000"/>
@@ -262,7 +262,7 @@
           <a:p>
             <a:fld id="{0C193083-F695-41A6-A514-C6B01A0DC117}" type="datetimeFigureOut">
               <a:rPr lang="es-419" smtClean="0"/>
-              <a:t>12/9/2021</a:t>
+              <a:t>14/9/2021</a:t>
             </a:fld>
             <a:endParaRPr lang="es-419"/>
           </a:p>
@@ -462,7 +462,7 @@
           <a:p>
             <a:fld id="{0C193083-F695-41A6-A514-C6B01A0DC117}" type="datetimeFigureOut">
               <a:rPr lang="es-419" smtClean="0"/>
-              <a:t>12/9/2021</a:t>
+              <a:t>14/9/2021</a:t>
             </a:fld>
             <a:endParaRPr lang="es-419"/>
           </a:p>
@@ -672,7 +672,7 @@
           <a:p>
             <a:fld id="{0C193083-F695-41A6-A514-C6B01A0DC117}" type="datetimeFigureOut">
               <a:rPr lang="es-419" smtClean="0"/>
-              <a:t>12/9/2021</a:t>
+              <a:t>14/9/2021</a:t>
             </a:fld>
             <a:endParaRPr lang="es-419"/>
           </a:p>
@@ -872,7 +872,7 @@
           <a:p>
             <a:fld id="{0C193083-F695-41A6-A514-C6B01A0DC117}" type="datetimeFigureOut">
               <a:rPr lang="es-419" smtClean="0"/>
-              <a:t>12/9/2021</a:t>
+              <a:t>14/9/2021</a:t>
             </a:fld>
             <a:endParaRPr lang="es-419"/>
           </a:p>
@@ -1148,7 +1148,7 @@
           <a:p>
             <a:fld id="{0C193083-F695-41A6-A514-C6B01A0DC117}" type="datetimeFigureOut">
               <a:rPr lang="es-419" smtClean="0"/>
-              <a:t>12/9/2021</a:t>
+              <a:t>14/9/2021</a:t>
             </a:fld>
             <a:endParaRPr lang="es-419"/>
           </a:p>
@@ -1416,7 +1416,7 @@
           <a:p>
             <a:fld id="{0C193083-F695-41A6-A514-C6B01A0DC117}" type="datetimeFigureOut">
               <a:rPr lang="es-419" smtClean="0"/>
-              <a:t>12/9/2021</a:t>
+              <a:t>14/9/2021</a:t>
             </a:fld>
             <a:endParaRPr lang="es-419"/>
           </a:p>
@@ -1831,7 +1831,7 @@
           <a:p>
             <a:fld id="{0C193083-F695-41A6-A514-C6B01A0DC117}" type="datetimeFigureOut">
               <a:rPr lang="es-419" smtClean="0"/>
-              <a:t>12/9/2021</a:t>
+              <a:t>14/9/2021</a:t>
             </a:fld>
             <a:endParaRPr lang="es-419"/>
           </a:p>
@@ -1973,7 +1973,7 @@
           <a:p>
             <a:fld id="{0C193083-F695-41A6-A514-C6B01A0DC117}" type="datetimeFigureOut">
               <a:rPr lang="es-419" smtClean="0"/>
-              <a:t>12/9/2021</a:t>
+              <a:t>14/9/2021</a:t>
             </a:fld>
             <a:endParaRPr lang="es-419"/>
           </a:p>
@@ -2086,7 +2086,7 @@
           <a:p>
             <a:fld id="{0C193083-F695-41A6-A514-C6B01A0DC117}" type="datetimeFigureOut">
               <a:rPr lang="es-419" smtClean="0"/>
-              <a:t>12/9/2021</a:t>
+              <a:t>14/9/2021</a:t>
             </a:fld>
             <a:endParaRPr lang="es-419"/>
           </a:p>
@@ -2399,7 +2399,7 @@
           <a:p>
             <a:fld id="{0C193083-F695-41A6-A514-C6B01A0DC117}" type="datetimeFigureOut">
               <a:rPr lang="es-419" smtClean="0"/>
-              <a:t>12/9/2021</a:t>
+              <a:t>14/9/2021</a:t>
             </a:fld>
             <a:endParaRPr lang="es-419"/>
           </a:p>
@@ -2688,7 +2688,7 @@
           <a:p>
             <a:fld id="{0C193083-F695-41A6-A514-C6B01A0DC117}" type="datetimeFigureOut">
               <a:rPr lang="es-419" smtClean="0"/>
-              <a:t>12/9/2021</a:t>
+              <a:t>14/9/2021</a:t>
             </a:fld>
             <a:endParaRPr lang="es-419"/>
           </a:p>
@@ -2931,7 +2931,7 @@
           <a:p>
             <a:fld id="{0C193083-F695-41A6-A514-C6B01A0DC117}" type="datetimeFigureOut">
               <a:rPr lang="es-419" smtClean="0"/>
-              <a:t>12/9/2021</a:t>
+              <a:t>14/9/2021</a:t>
             </a:fld>
             <a:endParaRPr lang="es-419"/>
           </a:p>
@@ -4158,8 +4158,8 @@
         </p:nvSpPr>
         <p:spPr>
           <a:xfrm>
-            <a:off x="4677395" y="3930929"/>
-            <a:ext cx="2837209" cy="883756"/>
+            <a:off x="3785253" y="4086066"/>
+            <a:ext cx="2360808" cy="1376981"/>
           </a:xfrm>
           <a:prstGeom prst="rect">
             <a:avLst/>
@@ -4195,10 +4195,10 @@
       </p:sp>
       <p:sp>
         <p:nvSpPr>
-          <p:cNvPr id="21" name="Rectángulo 20">
-            <a:extLst>
-              <a:ext uri="{FF2B5EF4-FFF2-40B4-BE49-F238E27FC236}">
-                <a16:creationId xmlns:a16="http://schemas.microsoft.com/office/drawing/2014/main" id="{1CE23F84-C3CC-4E1B-A64D-DF2D2FF64D8E}"/>
+          <p:cNvPr id="24" name="Rectángulo 23">
+            <a:extLst>
+              <a:ext uri="{FF2B5EF4-FFF2-40B4-BE49-F238E27FC236}">
+                <a16:creationId xmlns:a16="http://schemas.microsoft.com/office/drawing/2014/main" id="{F6BF378D-87E9-4F3D-9CA2-CFD4C9EF8218}"/>
               </a:ext>
             </a:extLst>
           </p:cNvPr>
@@ -4207,8 +4207,8 @@
         </p:nvSpPr>
         <p:spPr>
           <a:xfrm>
-            <a:off x="4838699" y="4838288"/>
-            <a:ext cx="2620617" cy="327575"/>
+            <a:off x="4388954" y="4276989"/>
+            <a:ext cx="1136686" cy="629895"/>
           </a:xfrm>
           <a:prstGeom prst="rect">
             <a:avLst/>
@@ -4238,20 +4238,16 @@
           <a:lstStyle/>
           <a:p>
             <a:pPr algn="ctr"/>
-            <a:r>
-              <a:rPr lang="es-ES" dirty="0" err="1"/>
-              <a:t>Descripcion</a:t>
-            </a:r>
             <a:endParaRPr lang="es-419" dirty="0"/>
           </a:p>
         </p:txBody>
       </p:sp>
       <p:sp>
         <p:nvSpPr>
-          <p:cNvPr id="22" name="Rectángulo: esquinas redondeadas 21">
-            <a:extLst>
-              <a:ext uri="{FF2B5EF4-FFF2-40B4-BE49-F238E27FC236}">
-                <a16:creationId xmlns:a16="http://schemas.microsoft.com/office/drawing/2014/main" id="{56BDDA12-D62C-4CD0-A7B2-EEF5E9D180DA}"/>
+          <p:cNvPr id="26" name="Rectángulo: esquinas redondeadas 25">
+            <a:extLst>
+              <a:ext uri="{FF2B5EF4-FFF2-40B4-BE49-F238E27FC236}">
+                <a16:creationId xmlns:a16="http://schemas.microsoft.com/office/drawing/2014/main" id="{45CAE950-0BE1-4772-B20B-D216B0AF6489}"/>
               </a:ext>
             </a:extLst>
           </p:cNvPr>
@@ -4260,8 +4256,8 @@
         </p:nvSpPr>
         <p:spPr>
           <a:xfrm>
-            <a:off x="4993583" y="5189466"/>
-            <a:ext cx="2310848" cy="331304"/>
+            <a:off x="4255214" y="4549199"/>
+            <a:ext cx="236469" cy="456164"/>
           </a:xfrm>
           <a:prstGeom prst="roundRect">
             <a:avLst/>
@@ -4291,32 +4287,16 @@
           <a:lstStyle/>
           <a:p>
             <a:pPr algn="ctr"/>
-            <a:r>
-              <a:rPr lang="es-ES" dirty="0"/>
-              <a:t>Link a </a:t>
-            </a:r>
-            <a:r>
-              <a:rPr lang="es-ES" dirty="0" err="1"/>
-              <a:t>code</a:t>
-            </a:r>
-            <a:r>
-              <a:rPr lang="es-ES" dirty="0"/>
-              <a:t> </a:t>
-            </a:r>
-            <a:r>
-              <a:rPr lang="es-ES" dirty="0" err="1"/>
-              <a:t>sandbox</a:t>
-            </a:r>
             <a:endParaRPr lang="es-419" dirty="0"/>
           </a:p>
         </p:txBody>
       </p:sp>
       <p:sp>
         <p:nvSpPr>
-          <p:cNvPr id="24" name="Rectángulo 23">
-            <a:extLst>
-              <a:ext uri="{FF2B5EF4-FFF2-40B4-BE49-F238E27FC236}">
-                <a16:creationId xmlns:a16="http://schemas.microsoft.com/office/drawing/2014/main" id="{F6BF378D-87E9-4F3D-9CA2-CFD4C9EF8218}"/>
+          <p:cNvPr id="27" name="Rectángulo 26">
+            <a:extLst>
+              <a:ext uri="{FF2B5EF4-FFF2-40B4-BE49-F238E27FC236}">
+                <a16:creationId xmlns:a16="http://schemas.microsoft.com/office/drawing/2014/main" id="{F82724DC-3071-4582-A569-D761E3F3B4A5}"/>
               </a:ext>
             </a:extLst>
           </p:cNvPr>
@@ -4325,8 +4305,8 @@
         </p:nvSpPr>
         <p:spPr>
           <a:xfrm>
-            <a:off x="5562288" y="4029072"/>
-            <a:ext cx="1136686" cy="629895"/>
+            <a:off x="4893987" y="5794671"/>
+            <a:ext cx="2620617" cy="358224"/>
           </a:xfrm>
           <a:prstGeom prst="rect">
             <a:avLst/>
@@ -4356,16 +4336,20 @@
           <a:lstStyle/>
           <a:p>
             <a:pPr algn="ctr"/>
+            <a:r>
+              <a:rPr lang="es-ES" dirty="0"/>
+              <a:t>tecnologías</a:t>
+            </a:r>
             <a:endParaRPr lang="es-419" dirty="0"/>
           </a:p>
         </p:txBody>
       </p:sp>
       <p:sp>
         <p:nvSpPr>
-          <p:cNvPr id="26" name="Rectángulo: esquinas redondeadas 25">
-            <a:extLst>
-              <a:ext uri="{FF2B5EF4-FFF2-40B4-BE49-F238E27FC236}">
-                <a16:creationId xmlns:a16="http://schemas.microsoft.com/office/drawing/2014/main" id="{45CAE950-0BE1-4772-B20B-D216B0AF6489}"/>
+          <p:cNvPr id="28" name="Rectángulo 27">
+            <a:extLst>
+              <a:ext uri="{FF2B5EF4-FFF2-40B4-BE49-F238E27FC236}">
+                <a16:creationId xmlns:a16="http://schemas.microsoft.com/office/drawing/2014/main" id="{C523083B-4A8C-435E-A331-A9388C79DC75}"/>
               </a:ext>
             </a:extLst>
           </p:cNvPr>
@@ -4374,8 +4358,269 @@
         </p:nvSpPr>
         <p:spPr>
           <a:xfrm>
-            <a:off x="5485053" y="4280662"/>
-            <a:ext cx="236469" cy="456164"/>
+            <a:off x="3530796" y="6267864"/>
+            <a:ext cx="5236421" cy="358224"/>
+          </a:xfrm>
+          <a:prstGeom prst="rect">
+            <a:avLst/>
+          </a:prstGeom>
+          <a:ln w="28575">
+            <a:solidFill>
+              <a:srgbClr val="C00000"/>
+            </a:solidFill>
+          </a:ln>
+        </p:spPr>
+        <p:style>
+          <a:lnRef idx="2">
+            <a:schemeClr val="accent6"/>
+          </a:lnRef>
+          <a:fillRef idx="1">
+            <a:schemeClr val="lt1"/>
+          </a:fillRef>
+          <a:effectRef idx="0">
+            <a:schemeClr val="accent6"/>
+          </a:effectRef>
+          <a:fontRef idx="minor">
+            <a:schemeClr val="dk1"/>
+          </a:fontRef>
+        </p:style>
+        <p:txBody>
+          <a:bodyPr rtlCol="0" anchor="ctr"/>
+          <a:lstStyle/>
+          <a:p>
+            <a:pPr algn="ctr"/>
+            <a:endParaRPr lang="es-419" dirty="0"/>
+          </a:p>
+        </p:txBody>
+      </p:sp>
+      <p:sp>
+        <p:nvSpPr>
+          <p:cNvPr id="29" name="Rectángulo 28">
+            <a:extLst>
+              <a:ext uri="{FF2B5EF4-FFF2-40B4-BE49-F238E27FC236}">
+                <a16:creationId xmlns:a16="http://schemas.microsoft.com/office/drawing/2014/main" id="{F97B20DF-0412-4F66-87E5-A6861668B423}"/>
+              </a:ext>
+            </a:extLst>
+          </p:cNvPr>
+          <p:cNvSpPr/>
+          <p:nvPr/>
+        </p:nvSpPr>
+        <p:spPr>
+          <a:xfrm>
+            <a:off x="3631095" y="6238410"/>
+            <a:ext cx="999712" cy="417132"/>
+          </a:xfrm>
+          <a:prstGeom prst="rect">
+            <a:avLst/>
+          </a:prstGeom>
+          <a:ln w="28575">
+            <a:solidFill>
+              <a:srgbClr val="C00000"/>
+            </a:solidFill>
+          </a:ln>
+        </p:spPr>
+        <p:style>
+          <a:lnRef idx="2">
+            <a:schemeClr val="accent6"/>
+          </a:lnRef>
+          <a:fillRef idx="1">
+            <a:schemeClr val="lt1"/>
+          </a:fillRef>
+          <a:effectRef idx="0">
+            <a:schemeClr val="accent6"/>
+          </a:effectRef>
+          <a:fontRef idx="minor">
+            <a:schemeClr val="dk1"/>
+          </a:fontRef>
+        </p:style>
+        <p:txBody>
+          <a:bodyPr rtlCol="0" anchor="ctr"/>
+          <a:lstStyle/>
+          <a:p>
+            <a:pPr algn="ctr"/>
+            <a:r>
+              <a:rPr lang="es-ES" dirty="0" err="1"/>
+              <a:t>Info</a:t>
+            </a:r>
+            <a:r>
+              <a:rPr lang="es-ES" dirty="0"/>
+              <a:t> contacto</a:t>
+            </a:r>
+            <a:endParaRPr lang="es-419" dirty="0"/>
+          </a:p>
+        </p:txBody>
+      </p:sp>
+      <p:sp>
+        <p:nvSpPr>
+          <p:cNvPr id="30" name="Rectángulo 29">
+            <a:extLst>
+              <a:ext uri="{FF2B5EF4-FFF2-40B4-BE49-F238E27FC236}">
+                <a16:creationId xmlns:a16="http://schemas.microsoft.com/office/drawing/2014/main" id="{462D3592-239A-4907-AD8A-C3FB22F8D237}"/>
+              </a:ext>
+            </a:extLst>
+          </p:cNvPr>
+          <p:cNvSpPr/>
+          <p:nvPr/>
+        </p:nvSpPr>
+        <p:spPr>
+          <a:xfrm>
+            <a:off x="6486734" y="6362444"/>
+            <a:ext cx="2148921" cy="185581"/>
+          </a:xfrm>
+          <a:prstGeom prst="rect">
+            <a:avLst/>
+          </a:prstGeom>
+          <a:ln w="28575">
+            <a:solidFill>
+              <a:srgbClr val="C00000"/>
+            </a:solidFill>
+          </a:ln>
+        </p:spPr>
+        <p:style>
+          <a:lnRef idx="2">
+            <a:schemeClr val="accent6"/>
+          </a:lnRef>
+          <a:fillRef idx="1">
+            <a:schemeClr val="lt1"/>
+          </a:fillRef>
+          <a:effectRef idx="0">
+            <a:schemeClr val="accent6"/>
+          </a:effectRef>
+          <a:fontRef idx="minor">
+            <a:schemeClr val="dk1"/>
+          </a:fontRef>
+        </p:style>
+        <p:txBody>
+          <a:bodyPr rtlCol="0" anchor="ctr"/>
+          <a:lstStyle/>
+          <a:p>
+            <a:pPr algn="ctr"/>
+            <a:r>
+              <a:rPr lang="es-ES" dirty="0"/>
+              <a:t>Link a redes</a:t>
+            </a:r>
+            <a:endParaRPr lang="es-419" dirty="0"/>
+          </a:p>
+        </p:txBody>
+      </p:sp>
+      <p:sp>
+        <p:nvSpPr>
+          <p:cNvPr id="31" name="Rectángulo 30">
+            <a:extLst>
+              <a:ext uri="{FF2B5EF4-FFF2-40B4-BE49-F238E27FC236}">
+                <a16:creationId xmlns:a16="http://schemas.microsoft.com/office/drawing/2014/main" id="{8968988B-D320-4661-BF08-2FD2669DFA1B}"/>
+              </a:ext>
+            </a:extLst>
+          </p:cNvPr>
+          <p:cNvSpPr/>
+          <p:nvPr/>
+        </p:nvSpPr>
+        <p:spPr>
+          <a:xfrm>
+            <a:off x="6222624" y="4086065"/>
+            <a:ext cx="2290138" cy="1376981"/>
+          </a:xfrm>
+          <a:prstGeom prst="rect">
+            <a:avLst/>
+          </a:prstGeom>
+          <a:ln w="28575">
+            <a:solidFill>
+              <a:srgbClr val="C00000"/>
+            </a:solidFill>
+          </a:ln>
+        </p:spPr>
+        <p:style>
+          <a:lnRef idx="2">
+            <a:schemeClr val="accent6"/>
+          </a:lnRef>
+          <a:fillRef idx="1">
+            <a:schemeClr val="lt1"/>
+          </a:fillRef>
+          <a:effectRef idx="0">
+            <a:schemeClr val="accent6"/>
+          </a:effectRef>
+          <a:fontRef idx="minor">
+            <a:schemeClr val="dk1"/>
+          </a:fontRef>
+        </p:style>
+        <p:txBody>
+          <a:bodyPr rtlCol="0" anchor="ctr"/>
+          <a:lstStyle/>
+          <a:p>
+            <a:pPr algn="ctr"/>
+            <a:endParaRPr lang="es-419" dirty="0"/>
+          </a:p>
+        </p:txBody>
+      </p:sp>
+      <p:sp>
+        <p:nvSpPr>
+          <p:cNvPr id="21" name="Rectángulo 20">
+            <a:extLst>
+              <a:ext uri="{FF2B5EF4-FFF2-40B4-BE49-F238E27FC236}">
+                <a16:creationId xmlns:a16="http://schemas.microsoft.com/office/drawing/2014/main" id="{1CE23F84-C3CC-4E1B-A64D-DF2D2FF64D8E}"/>
+              </a:ext>
+            </a:extLst>
+          </p:cNvPr>
+          <p:cNvSpPr/>
+          <p:nvPr/>
+        </p:nvSpPr>
+        <p:spPr>
+          <a:xfrm>
+            <a:off x="6313471" y="4250675"/>
+            <a:ext cx="2106868" cy="717480"/>
+          </a:xfrm>
+          <a:prstGeom prst="rect">
+            <a:avLst/>
+          </a:prstGeom>
+          <a:ln w="28575">
+            <a:solidFill>
+              <a:srgbClr val="C00000"/>
+            </a:solidFill>
+          </a:ln>
+        </p:spPr>
+        <p:style>
+          <a:lnRef idx="2">
+            <a:schemeClr val="accent6"/>
+          </a:lnRef>
+          <a:fillRef idx="1">
+            <a:schemeClr val="lt1"/>
+          </a:fillRef>
+          <a:effectRef idx="0">
+            <a:schemeClr val="accent6"/>
+          </a:effectRef>
+          <a:fontRef idx="minor">
+            <a:schemeClr val="dk1"/>
+          </a:fontRef>
+        </p:style>
+        <p:txBody>
+          <a:bodyPr rtlCol="0" anchor="ctr"/>
+          <a:lstStyle/>
+          <a:p>
+            <a:pPr algn="ctr"/>
+            <a:r>
+              <a:rPr lang="es-ES" dirty="0" err="1"/>
+              <a:t>Descripcion</a:t>
+            </a:r>
+            <a:endParaRPr lang="es-419" dirty="0"/>
+          </a:p>
+        </p:txBody>
+      </p:sp>
+      <p:sp>
+        <p:nvSpPr>
+          <p:cNvPr id="22" name="Rectángulo: esquinas redondeadas 21">
+            <a:extLst>
+              <a:ext uri="{FF2B5EF4-FFF2-40B4-BE49-F238E27FC236}">
+                <a16:creationId xmlns:a16="http://schemas.microsoft.com/office/drawing/2014/main" id="{56BDDA12-D62C-4CD0-A7B2-EEF5E9D180DA}"/>
+              </a:ext>
+            </a:extLst>
+          </p:cNvPr>
+          <p:cNvSpPr/>
+          <p:nvPr/>
+        </p:nvSpPr>
+        <p:spPr>
+          <a:xfrm>
+            <a:off x="6798562" y="5045766"/>
+            <a:ext cx="1136686" cy="277971"/>
           </a:xfrm>
           <a:prstGeom prst="roundRect">
             <a:avLst/>
@@ -4405,16 +4650,20 @@
           <a:lstStyle/>
           <a:p>
             <a:pPr algn="ctr"/>
+            <a:r>
+              <a:rPr lang="es-ES" dirty="0"/>
+              <a:t>Link</a:t>
+            </a:r>
             <a:endParaRPr lang="es-419" dirty="0"/>
           </a:p>
         </p:txBody>
       </p:sp>
       <p:sp>
         <p:nvSpPr>
-          <p:cNvPr id="27" name="Rectángulo 26">
-            <a:extLst>
-              <a:ext uri="{FF2B5EF4-FFF2-40B4-BE49-F238E27FC236}">
-                <a16:creationId xmlns:a16="http://schemas.microsoft.com/office/drawing/2014/main" id="{F82724DC-3071-4582-A569-D761E3F3B4A5}"/>
+          <p:cNvPr id="32" name="Rectángulo: esquinas redondeadas 31">
+            <a:extLst>
+              <a:ext uri="{FF2B5EF4-FFF2-40B4-BE49-F238E27FC236}">
+                <a16:creationId xmlns:a16="http://schemas.microsoft.com/office/drawing/2014/main" id="{030D074E-D65D-40DF-8B8B-BA5120026E8C}"/>
               </a:ext>
             </a:extLst>
           </p:cNvPr>
@@ -4423,10 +4672,10 @@
         </p:nvSpPr>
         <p:spPr>
           <a:xfrm>
-            <a:off x="4893987" y="5794671"/>
-            <a:ext cx="2620617" cy="358224"/>
-          </a:xfrm>
-          <a:prstGeom prst="rect">
+            <a:off x="4404952" y="5053742"/>
+            <a:ext cx="1136686" cy="277971"/>
+          </a:xfrm>
+          <a:prstGeom prst="roundRect">
             <a:avLst/>
           </a:prstGeom>
           <a:ln w="28575">
@@ -4456,7 +4705,7 @@
             <a:pPr algn="ctr"/>
             <a:r>
               <a:rPr lang="es-ES" dirty="0"/>
-              <a:t>tecnologías</a:t>
+              <a:t>Nombre</a:t>
             </a:r>
             <a:endParaRPr lang="es-419" dirty="0"/>
           </a:p>
@@ -4464,10 +4713,10 @@
       </p:sp>
       <p:sp>
         <p:nvSpPr>
-          <p:cNvPr id="28" name="Rectángulo 27">
-            <a:extLst>
-              <a:ext uri="{FF2B5EF4-FFF2-40B4-BE49-F238E27FC236}">
-                <a16:creationId xmlns:a16="http://schemas.microsoft.com/office/drawing/2014/main" id="{C523083B-4A8C-435E-A331-A9388C79DC75}"/>
+          <p:cNvPr id="33" name="Rectángulo 32">
+            <a:extLst>
+              <a:ext uri="{FF2B5EF4-FFF2-40B4-BE49-F238E27FC236}">
+                <a16:creationId xmlns:a16="http://schemas.microsoft.com/office/drawing/2014/main" id="{2302E692-D549-4B46-B64E-AD5099B96B7C}"/>
               </a:ext>
             </a:extLst>
           </p:cNvPr>
@@ -4476,15 +4725,17 @@
         </p:nvSpPr>
         <p:spPr>
           <a:xfrm>
-            <a:off x="3530796" y="6267864"/>
-            <a:ext cx="5236421" cy="358224"/>
+            <a:off x="3561522" y="3714340"/>
+            <a:ext cx="5118652" cy="407179"/>
           </a:xfrm>
           <a:prstGeom prst="rect">
             <a:avLst/>
           </a:prstGeom>
           <a:ln w="28575">
             <a:solidFill>
-              <a:srgbClr val="C00000"/>
+              <a:schemeClr val="accent1">
+                <a:lumMod val="50000"/>
+              </a:schemeClr>
             </a:solidFill>
           </a:ln>
         </p:spPr>
@@ -4507,117 +4758,10 @@
           <a:lstStyle/>
           <a:p>
             <a:pPr algn="ctr"/>
-            <a:endParaRPr lang="es-419" dirty="0"/>
-          </a:p>
-        </p:txBody>
-      </p:sp>
-      <p:sp>
-        <p:nvSpPr>
-          <p:cNvPr id="29" name="Rectángulo 28">
-            <a:extLst>
-              <a:ext uri="{FF2B5EF4-FFF2-40B4-BE49-F238E27FC236}">
-                <a16:creationId xmlns:a16="http://schemas.microsoft.com/office/drawing/2014/main" id="{F97B20DF-0412-4F66-87E5-A6861668B423}"/>
-              </a:ext>
-            </a:extLst>
-          </p:cNvPr>
-          <p:cNvSpPr/>
-          <p:nvPr/>
-        </p:nvSpPr>
-        <p:spPr>
-          <a:xfrm>
-            <a:off x="3631095" y="6238410"/>
-            <a:ext cx="999712" cy="417132"/>
-          </a:xfrm>
-          <a:prstGeom prst="rect">
-            <a:avLst/>
-          </a:prstGeom>
-          <a:ln w="28575">
-            <a:solidFill>
-              <a:srgbClr val="C00000"/>
-            </a:solidFill>
-          </a:ln>
-        </p:spPr>
-        <p:style>
-          <a:lnRef idx="2">
-            <a:schemeClr val="accent6"/>
-          </a:lnRef>
-          <a:fillRef idx="1">
-            <a:schemeClr val="lt1"/>
-          </a:fillRef>
-          <a:effectRef idx="0">
-            <a:schemeClr val="accent6"/>
-          </a:effectRef>
-          <a:fontRef idx="minor">
-            <a:schemeClr val="dk1"/>
-          </a:fontRef>
-        </p:style>
-        <p:txBody>
-          <a:bodyPr rtlCol="0" anchor="ctr"/>
-          <a:lstStyle/>
-          <a:p>
-            <a:pPr algn="ctr"/>
-            <a:r>
-              <a:rPr lang="es-ES" dirty="0" err="1"/>
-              <a:t>Info</a:t>
-            </a:r>
             <a:r>
               <a:rPr lang="es-ES" dirty="0"/>
-              <a:t> contacto</a:t>
-            </a:r>
-            <a:endParaRPr lang="es-419" dirty="0"/>
-          </a:p>
-        </p:txBody>
-      </p:sp>
-      <p:sp>
-        <p:nvSpPr>
-          <p:cNvPr id="30" name="Rectángulo 29">
-            <a:extLst>
-              <a:ext uri="{FF2B5EF4-FFF2-40B4-BE49-F238E27FC236}">
-                <a16:creationId xmlns:a16="http://schemas.microsoft.com/office/drawing/2014/main" id="{462D3592-239A-4907-AD8A-C3FB22F8D237}"/>
-              </a:ext>
-            </a:extLst>
-          </p:cNvPr>
-          <p:cNvSpPr/>
-          <p:nvPr/>
-        </p:nvSpPr>
-        <p:spPr>
-          <a:xfrm>
-            <a:off x="6486734" y="6362444"/>
-            <a:ext cx="2148921" cy="185581"/>
-          </a:xfrm>
-          <a:prstGeom prst="rect">
-            <a:avLst/>
-          </a:prstGeom>
-          <a:ln w="28575">
-            <a:solidFill>
-              <a:srgbClr val="C00000"/>
-            </a:solidFill>
-          </a:ln>
-        </p:spPr>
-        <p:style>
-          <a:lnRef idx="2">
-            <a:schemeClr val="accent6"/>
-          </a:lnRef>
-          <a:fillRef idx="1">
-            <a:schemeClr val="lt1"/>
-          </a:fillRef>
-          <a:effectRef idx="0">
-            <a:schemeClr val="accent6"/>
-          </a:effectRef>
-          <a:fontRef idx="minor">
-            <a:schemeClr val="dk1"/>
-          </a:fontRef>
-        </p:style>
-        <p:txBody>
-          <a:bodyPr rtlCol="0" anchor="ctr"/>
-          <a:lstStyle/>
-          <a:p>
-            <a:pPr algn="ctr"/>
-            <a:r>
-              <a:rPr lang="es-ES" dirty="0"/>
-              <a:t>Link a redes</a:t>
-            </a:r>
-            <a:endParaRPr lang="es-419" dirty="0"/>
+              <a:t>Agregar nombre de sección? Aquí arriba?</a:t>
+            </a:r>
           </a:p>
         </p:txBody>
       </p:sp>
@@ -4651,45 +4795,472 @@
           <a:chExt cx="0" cy="0"/>
         </a:xfrm>
       </p:grpSpPr>
-      <p:pic>
-        <p:nvPicPr>
-          <p:cNvPr id="5" name="Imagen 4" descr="Un hombre con barba y bigote&#10;&#10;Descripción generada automáticamente">
-            <a:extLst>
-              <a:ext uri="{FF2B5EF4-FFF2-40B4-BE49-F238E27FC236}">
-                <a16:creationId xmlns:a16="http://schemas.microsoft.com/office/drawing/2014/main" id="{5C3E3B95-886E-4FF1-9D0B-9A8729904421}"/>
-              </a:ext>
-            </a:extLst>
-          </p:cNvPr>
-          <p:cNvPicPr>
-            <a:picLocks noChangeAspect="1"/>
-          </p:cNvPicPr>
+      <p:sp>
+        <p:nvSpPr>
+          <p:cNvPr id="4" name="Rectángulo 3">
+            <a:extLst>
+              <a:ext uri="{FF2B5EF4-FFF2-40B4-BE49-F238E27FC236}">
+                <a16:creationId xmlns:a16="http://schemas.microsoft.com/office/drawing/2014/main" id="{E825BC5F-6DF7-40A9-8203-1D49BB7040B1}"/>
+              </a:ext>
+            </a:extLst>
+          </p:cNvPr>
+          <p:cNvSpPr/>
           <p:nvPr/>
-        </p:nvPicPr>
-        <p:blipFill rotWithShape="1">
-          <a:blip r:embed="rId2">
-            <a:extLst>
-              <a:ext uri="{28A0092B-C50C-407E-A947-70E740481C1C}">
-                <a14:useLocalDpi xmlns:a14="http://schemas.microsoft.com/office/drawing/2010/main" val="0"/>
-              </a:ext>
-            </a:extLst>
-          </a:blip>
-          <a:srcRect l="17718" r="7282"/>
-          <a:stretch/>
-        </p:blipFill>
-        <p:spPr>
-          <a:xfrm>
-            <a:off x="3524250" y="0"/>
-            <a:ext cx="5143500" cy="6858000"/>
-          </a:xfrm>
-          <a:prstGeom prst="ellipse">
+        </p:nvSpPr>
+        <p:spPr>
+          <a:xfrm>
+            <a:off x="591417" y="198783"/>
+            <a:ext cx="9811540" cy="5352533"/>
+          </a:xfrm>
+          <a:prstGeom prst="rect">
             <a:avLst/>
           </a:prstGeom>
-        </p:spPr>
-      </p:pic>
+          <a:ln w="28575">
+            <a:solidFill>
+              <a:srgbClr val="C00000"/>
+            </a:solidFill>
+          </a:ln>
+        </p:spPr>
+        <p:style>
+          <a:lnRef idx="2">
+            <a:schemeClr val="accent6"/>
+          </a:lnRef>
+          <a:fillRef idx="1">
+            <a:schemeClr val="lt1"/>
+          </a:fillRef>
+          <a:effectRef idx="0">
+            <a:schemeClr val="accent6"/>
+          </a:effectRef>
+          <a:fontRef idx="minor">
+            <a:schemeClr val="dk1"/>
+          </a:fontRef>
+        </p:style>
+        <p:txBody>
+          <a:bodyPr rtlCol="0" anchor="ctr"/>
+          <a:lstStyle/>
+          <a:p>
+            <a:pPr algn="ctr"/>
+            <a:endParaRPr lang="es-419" dirty="0"/>
+          </a:p>
+        </p:txBody>
+      </p:sp>
+      <p:sp>
+        <p:nvSpPr>
+          <p:cNvPr id="5" name="Rectángulo 4">
+            <a:extLst>
+              <a:ext uri="{FF2B5EF4-FFF2-40B4-BE49-F238E27FC236}">
+                <a16:creationId xmlns:a16="http://schemas.microsoft.com/office/drawing/2014/main" id="{44F5466F-1325-45DA-AB04-BDCDF74DBA98}"/>
+              </a:ext>
+            </a:extLst>
+          </p:cNvPr>
+          <p:cNvSpPr/>
+          <p:nvPr/>
+        </p:nvSpPr>
+        <p:spPr>
+          <a:xfrm>
+            <a:off x="682950" y="773906"/>
+            <a:ext cx="4722704" cy="3930616"/>
+          </a:xfrm>
+          <a:prstGeom prst="rect">
+            <a:avLst/>
+          </a:prstGeom>
+          <a:ln w="28575">
+            <a:solidFill>
+              <a:schemeClr val="accent1">
+                <a:lumMod val="50000"/>
+              </a:schemeClr>
+            </a:solidFill>
+          </a:ln>
+        </p:spPr>
+        <p:style>
+          <a:lnRef idx="2">
+            <a:schemeClr val="accent6"/>
+          </a:lnRef>
+          <a:fillRef idx="1">
+            <a:schemeClr val="lt1"/>
+          </a:fillRef>
+          <a:effectRef idx="0">
+            <a:schemeClr val="accent6"/>
+          </a:effectRef>
+          <a:fontRef idx="minor">
+            <a:schemeClr val="dk1"/>
+          </a:fontRef>
+        </p:style>
+        <p:txBody>
+          <a:bodyPr rtlCol="0" anchor="ctr"/>
+          <a:lstStyle/>
+          <a:p>
+            <a:pPr algn="ctr"/>
+            <a:endParaRPr lang="es-419" dirty="0"/>
+          </a:p>
+        </p:txBody>
+      </p:sp>
+      <p:sp>
+        <p:nvSpPr>
+          <p:cNvPr id="6" name="Rectángulo 5">
+            <a:extLst>
+              <a:ext uri="{FF2B5EF4-FFF2-40B4-BE49-F238E27FC236}">
+                <a16:creationId xmlns:a16="http://schemas.microsoft.com/office/drawing/2014/main" id="{376B78A6-30F0-48B0-A3E3-F59C3AB73C7B}"/>
+              </a:ext>
+            </a:extLst>
+          </p:cNvPr>
+          <p:cNvSpPr/>
+          <p:nvPr/>
+        </p:nvSpPr>
+        <p:spPr>
+          <a:xfrm>
+            <a:off x="5616457" y="773906"/>
+            <a:ext cx="4722704" cy="3930616"/>
+          </a:xfrm>
+          <a:prstGeom prst="rect">
+            <a:avLst/>
+          </a:prstGeom>
+          <a:ln w="28575">
+            <a:solidFill>
+              <a:schemeClr val="accent1">
+                <a:lumMod val="50000"/>
+              </a:schemeClr>
+            </a:solidFill>
+          </a:ln>
+        </p:spPr>
+        <p:style>
+          <a:lnRef idx="2">
+            <a:schemeClr val="accent6"/>
+          </a:lnRef>
+          <a:fillRef idx="1">
+            <a:schemeClr val="lt1"/>
+          </a:fillRef>
+          <a:effectRef idx="0">
+            <a:schemeClr val="accent6"/>
+          </a:effectRef>
+          <a:fontRef idx="minor">
+            <a:schemeClr val="dk1"/>
+          </a:fontRef>
+        </p:style>
+        <p:txBody>
+          <a:bodyPr rtlCol="0" anchor="ctr"/>
+          <a:lstStyle/>
+          <a:p>
+            <a:pPr algn="ctr"/>
+            <a:endParaRPr lang="es-419" dirty="0"/>
+          </a:p>
+        </p:txBody>
+      </p:sp>
+      <p:sp>
+        <p:nvSpPr>
+          <p:cNvPr id="7" name="Rectángulo 6">
+            <a:extLst>
+              <a:ext uri="{FF2B5EF4-FFF2-40B4-BE49-F238E27FC236}">
+                <a16:creationId xmlns:a16="http://schemas.microsoft.com/office/drawing/2014/main" id="{1B682F4C-CCA4-4679-ABBF-C941505EED95}"/>
+              </a:ext>
+            </a:extLst>
+          </p:cNvPr>
+          <p:cNvSpPr/>
+          <p:nvPr/>
+        </p:nvSpPr>
+        <p:spPr>
+          <a:xfrm>
+            <a:off x="1323792" y="1176131"/>
+            <a:ext cx="3733337" cy="2252869"/>
+          </a:xfrm>
+          <a:prstGeom prst="rect">
+            <a:avLst/>
+          </a:prstGeom>
+          <a:ln w="28575">
+            <a:solidFill>
+              <a:srgbClr val="C00000"/>
+            </a:solidFill>
+          </a:ln>
+        </p:spPr>
+        <p:style>
+          <a:lnRef idx="2">
+            <a:schemeClr val="accent6"/>
+          </a:lnRef>
+          <a:fillRef idx="1">
+            <a:schemeClr val="lt1"/>
+          </a:fillRef>
+          <a:effectRef idx="0">
+            <a:schemeClr val="accent6"/>
+          </a:effectRef>
+          <a:fontRef idx="minor">
+            <a:schemeClr val="dk1"/>
+          </a:fontRef>
+        </p:style>
+        <p:txBody>
+          <a:bodyPr rtlCol="0" anchor="ctr"/>
+          <a:lstStyle/>
+          <a:p>
+            <a:pPr algn="ctr"/>
+            <a:r>
+              <a:rPr lang="es-419" dirty="0"/>
+              <a:t>desktop</a:t>
+            </a:r>
+          </a:p>
+        </p:txBody>
+      </p:sp>
+      <p:sp>
+        <p:nvSpPr>
+          <p:cNvPr id="8" name="Rectángulo 7">
+            <a:extLst>
+              <a:ext uri="{FF2B5EF4-FFF2-40B4-BE49-F238E27FC236}">
+                <a16:creationId xmlns:a16="http://schemas.microsoft.com/office/drawing/2014/main" id="{2AB734E0-81F4-4C09-840D-4DFEAC1BA085}"/>
+              </a:ext>
+            </a:extLst>
+          </p:cNvPr>
+          <p:cNvSpPr/>
+          <p:nvPr/>
+        </p:nvSpPr>
+        <p:spPr>
+          <a:xfrm>
+            <a:off x="858347" y="2031271"/>
+            <a:ext cx="930502" cy="1573074"/>
+          </a:xfrm>
+          <a:prstGeom prst="rect">
+            <a:avLst/>
+          </a:prstGeom>
+          <a:ln w="28575">
+            <a:solidFill>
+              <a:srgbClr val="C00000"/>
+            </a:solidFill>
+          </a:ln>
+        </p:spPr>
+        <p:style>
+          <a:lnRef idx="2">
+            <a:schemeClr val="accent6"/>
+          </a:lnRef>
+          <a:fillRef idx="1">
+            <a:schemeClr val="lt1"/>
+          </a:fillRef>
+          <a:effectRef idx="0">
+            <a:schemeClr val="accent6"/>
+          </a:effectRef>
+          <a:fontRef idx="minor">
+            <a:schemeClr val="dk1"/>
+          </a:fontRef>
+        </p:style>
+        <p:txBody>
+          <a:bodyPr rtlCol="0" anchor="ctr"/>
+          <a:lstStyle/>
+          <a:p>
+            <a:pPr algn="ctr"/>
+            <a:r>
+              <a:rPr lang="es-419" dirty="0" err="1"/>
+              <a:t>mobile</a:t>
+            </a:r>
+            <a:endParaRPr lang="es-419" dirty="0"/>
+          </a:p>
+        </p:txBody>
+      </p:sp>
+      <p:sp>
+        <p:nvSpPr>
+          <p:cNvPr id="9" name="Rectángulo 8">
+            <a:extLst>
+              <a:ext uri="{FF2B5EF4-FFF2-40B4-BE49-F238E27FC236}">
+                <a16:creationId xmlns:a16="http://schemas.microsoft.com/office/drawing/2014/main" id="{9B32DF9F-9125-46E6-8B81-ACF876A808B1}"/>
+              </a:ext>
+            </a:extLst>
+          </p:cNvPr>
+          <p:cNvSpPr/>
+          <p:nvPr/>
+        </p:nvSpPr>
+        <p:spPr>
+          <a:xfrm>
+            <a:off x="6111139" y="1129712"/>
+            <a:ext cx="3733337" cy="2252869"/>
+          </a:xfrm>
+          <a:prstGeom prst="rect">
+            <a:avLst/>
+          </a:prstGeom>
+          <a:ln w="28575">
+            <a:solidFill>
+              <a:srgbClr val="C00000"/>
+            </a:solidFill>
+          </a:ln>
+        </p:spPr>
+        <p:style>
+          <a:lnRef idx="2">
+            <a:schemeClr val="accent6"/>
+          </a:lnRef>
+          <a:fillRef idx="1">
+            <a:schemeClr val="lt1"/>
+          </a:fillRef>
+          <a:effectRef idx="0">
+            <a:schemeClr val="accent6"/>
+          </a:effectRef>
+          <a:fontRef idx="minor">
+            <a:schemeClr val="dk1"/>
+          </a:fontRef>
+        </p:style>
+        <p:txBody>
+          <a:bodyPr rtlCol="0" anchor="ctr"/>
+          <a:lstStyle/>
+          <a:p>
+            <a:pPr algn="ctr"/>
+            <a:endParaRPr lang="es-419" dirty="0"/>
+          </a:p>
+        </p:txBody>
+      </p:sp>
+      <p:sp>
+        <p:nvSpPr>
+          <p:cNvPr id="10" name="Rectángulo 9">
+            <a:extLst>
+              <a:ext uri="{FF2B5EF4-FFF2-40B4-BE49-F238E27FC236}">
+                <a16:creationId xmlns:a16="http://schemas.microsoft.com/office/drawing/2014/main" id="{DC5A3CD1-E639-42EF-935B-ECAC5F6D75F7}"/>
+              </a:ext>
+            </a:extLst>
+          </p:cNvPr>
+          <p:cNvSpPr/>
+          <p:nvPr/>
+        </p:nvSpPr>
+        <p:spPr>
+          <a:xfrm>
+            <a:off x="7132980" y="3804181"/>
+            <a:ext cx="1689652" cy="450623"/>
+          </a:xfrm>
+          <a:prstGeom prst="rect">
+            <a:avLst/>
+          </a:prstGeom>
+          <a:ln w="28575">
+            <a:solidFill>
+              <a:srgbClr val="C00000"/>
+            </a:solidFill>
+          </a:ln>
+        </p:spPr>
+        <p:style>
+          <a:lnRef idx="2">
+            <a:schemeClr val="accent6"/>
+          </a:lnRef>
+          <a:fillRef idx="1">
+            <a:schemeClr val="lt1"/>
+          </a:fillRef>
+          <a:effectRef idx="0">
+            <a:schemeClr val="accent6"/>
+          </a:effectRef>
+          <a:fontRef idx="minor">
+            <a:schemeClr val="dk1"/>
+          </a:fontRef>
+        </p:style>
+        <p:txBody>
+          <a:bodyPr rtlCol="0" anchor="ctr"/>
+          <a:lstStyle/>
+          <a:p>
+            <a:pPr algn="ctr"/>
+            <a:r>
+              <a:rPr lang="es-419" dirty="0" err="1"/>
+              <a:t>llink</a:t>
+            </a:r>
+            <a:endParaRPr lang="es-419" dirty="0"/>
+          </a:p>
+        </p:txBody>
+      </p:sp>
+      <p:sp>
+        <p:nvSpPr>
+          <p:cNvPr id="11" name="Rectángulo 10">
+            <a:extLst>
+              <a:ext uri="{FF2B5EF4-FFF2-40B4-BE49-F238E27FC236}">
+                <a16:creationId xmlns:a16="http://schemas.microsoft.com/office/drawing/2014/main" id="{DEBC5545-54EA-4E22-B466-222D93DC40E5}"/>
+              </a:ext>
+            </a:extLst>
+          </p:cNvPr>
+          <p:cNvSpPr/>
+          <p:nvPr/>
+        </p:nvSpPr>
+        <p:spPr>
+          <a:xfrm>
+            <a:off x="6454587" y="1277141"/>
+            <a:ext cx="3046439" cy="1958009"/>
+          </a:xfrm>
+          <a:prstGeom prst="rect">
+            <a:avLst/>
+          </a:prstGeom>
+          <a:ln w="28575">
+            <a:solidFill>
+              <a:srgbClr val="C00000"/>
+            </a:solidFill>
+          </a:ln>
+        </p:spPr>
+        <p:style>
+          <a:lnRef idx="2">
+            <a:schemeClr val="accent6"/>
+          </a:lnRef>
+          <a:fillRef idx="1">
+            <a:schemeClr val="lt1"/>
+          </a:fillRef>
+          <a:effectRef idx="0">
+            <a:schemeClr val="accent6"/>
+          </a:effectRef>
+          <a:fontRef idx="minor">
+            <a:schemeClr val="dk1"/>
+          </a:fontRef>
+        </p:style>
+        <p:txBody>
+          <a:bodyPr rtlCol="0" anchor="ctr"/>
+          <a:lstStyle/>
+          <a:p>
+            <a:pPr algn="ctr"/>
+            <a:r>
+              <a:rPr lang="es-419" dirty="0"/>
+              <a:t>texto</a:t>
+            </a:r>
+          </a:p>
+        </p:txBody>
+      </p:sp>
+      <p:sp>
+        <p:nvSpPr>
+          <p:cNvPr id="12" name="Rectángulo 11">
+            <a:extLst>
+              <a:ext uri="{FF2B5EF4-FFF2-40B4-BE49-F238E27FC236}">
+                <a16:creationId xmlns:a16="http://schemas.microsoft.com/office/drawing/2014/main" id="{D15507F3-EF5F-4EFE-9C22-70A51B3BAE79}"/>
+              </a:ext>
+            </a:extLst>
+          </p:cNvPr>
+          <p:cNvSpPr/>
+          <p:nvPr/>
+        </p:nvSpPr>
+        <p:spPr>
+          <a:xfrm>
+            <a:off x="1743440" y="3804181"/>
+            <a:ext cx="2894039" cy="533372"/>
+          </a:xfrm>
+          <a:prstGeom prst="rect">
+            <a:avLst/>
+          </a:prstGeom>
+          <a:ln w="28575">
+            <a:solidFill>
+              <a:srgbClr val="C00000"/>
+            </a:solidFill>
+          </a:ln>
+        </p:spPr>
+        <p:style>
+          <a:lnRef idx="2">
+            <a:schemeClr val="accent6"/>
+          </a:lnRef>
+          <a:fillRef idx="1">
+            <a:schemeClr val="lt1"/>
+          </a:fillRef>
+          <a:effectRef idx="0">
+            <a:schemeClr val="accent6"/>
+          </a:effectRef>
+          <a:fontRef idx="minor">
+            <a:schemeClr val="dk1"/>
+          </a:fontRef>
+        </p:style>
+        <p:txBody>
+          <a:bodyPr rtlCol="0" anchor="ctr"/>
+          <a:lstStyle/>
+          <a:p>
+            <a:pPr algn="ctr"/>
+            <a:r>
+              <a:rPr lang="es-419" dirty="0"/>
+              <a:t>Nombre de Proyecto</a:t>
+            </a:r>
+          </a:p>
+        </p:txBody>
+      </p:sp>
     </p:spTree>
     <p:extLst>
       <p:ext uri="{BB962C8B-B14F-4D97-AF65-F5344CB8AC3E}">
-        <p14:creationId xmlns:p14="http://schemas.microsoft.com/office/powerpoint/2010/main" val="2504437832"/>
+        <p14:creationId xmlns:p14="http://schemas.microsoft.com/office/powerpoint/2010/main" val="2599953593"/>
       </p:ext>
     </p:extLst>
   </p:cSld>

</xml_diff>

<commit_message>
se agrega cambios al archivo de maquetado. Se agregan propiedades al package.json para correr gitpages y se crea modulo build
</commit_message>
<xml_diff>
--- a/Maquetado portfolio.pptx
+++ b/Maquetado portfolio.pptx
@@ -7,6 +7,7 @@
   <p:sldIdLst>
     <p:sldId id="256" r:id="rId2"/>
     <p:sldId id="258" r:id="rId3"/>
+    <p:sldId id="259" r:id="rId4"/>
   </p:sldIdLst>
   <p:sldSz cx="12192000" cy="6858000"/>
   <p:notesSz cx="6858000" cy="9144000"/>
@@ -262,7 +263,7 @@
           <a:p>
             <a:fld id="{0C193083-F695-41A6-A514-C6B01A0DC117}" type="datetimeFigureOut">
               <a:rPr lang="es-419" smtClean="0"/>
-              <a:t>14/9/2021</a:t>
+              <a:t>16/9/2021</a:t>
             </a:fld>
             <a:endParaRPr lang="es-419"/>
           </a:p>
@@ -462,7 +463,7 @@
           <a:p>
             <a:fld id="{0C193083-F695-41A6-A514-C6B01A0DC117}" type="datetimeFigureOut">
               <a:rPr lang="es-419" smtClean="0"/>
-              <a:t>14/9/2021</a:t>
+              <a:t>16/9/2021</a:t>
             </a:fld>
             <a:endParaRPr lang="es-419"/>
           </a:p>
@@ -672,7 +673,7 @@
           <a:p>
             <a:fld id="{0C193083-F695-41A6-A514-C6B01A0DC117}" type="datetimeFigureOut">
               <a:rPr lang="es-419" smtClean="0"/>
-              <a:t>14/9/2021</a:t>
+              <a:t>16/9/2021</a:t>
             </a:fld>
             <a:endParaRPr lang="es-419"/>
           </a:p>
@@ -872,7 +873,7 @@
           <a:p>
             <a:fld id="{0C193083-F695-41A6-A514-C6B01A0DC117}" type="datetimeFigureOut">
               <a:rPr lang="es-419" smtClean="0"/>
-              <a:t>14/9/2021</a:t>
+              <a:t>16/9/2021</a:t>
             </a:fld>
             <a:endParaRPr lang="es-419"/>
           </a:p>
@@ -1148,7 +1149,7 @@
           <a:p>
             <a:fld id="{0C193083-F695-41A6-A514-C6B01A0DC117}" type="datetimeFigureOut">
               <a:rPr lang="es-419" smtClean="0"/>
-              <a:t>14/9/2021</a:t>
+              <a:t>16/9/2021</a:t>
             </a:fld>
             <a:endParaRPr lang="es-419"/>
           </a:p>
@@ -1416,7 +1417,7 @@
           <a:p>
             <a:fld id="{0C193083-F695-41A6-A514-C6B01A0DC117}" type="datetimeFigureOut">
               <a:rPr lang="es-419" smtClean="0"/>
-              <a:t>14/9/2021</a:t>
+              <a:t>16/9/2021</a:t>
             </a:fld>
             <a:endParaRPr lang="es-419"/>
           </a:p>
@@ -1831,7 +1832,7 @@
           <a:p>
             <a:fld id="{0C193083-F695-41A6-A514-C6B01A0DC117}" type="datetimeFigureOut">
               <a:rPr lang="es-419" smtClean="0"/>
-              <a:t>14/9/2021</a:t>
+              <a:t>16/9/2021</a:t>
             </a:fld>
             <a:endParaRPr lang="es-419"/>
           </a:p>
@@ -1973,7 +1974,7 @@
           <a:p>
             <a:fld id="{0C193083-F695-41A6-A514-C6B01A0DC117}" type="datetimeFigureOut">
               <a:rPr lang="es-419" smtClean="0"/>
-              <a:t>14/9/2021</a:t>
+              <a:t>16/9/2021</a:t>
             </a:fld>
             <a:endParaRPr lang="es-419"/>
           </a:p>
@@ -2086,7 +2087,7 @@
           <a:p>
             <a:fld id="{0C193083-F695-41A6-A514-C6B01A0DC117}" type="datetimeFigureOut">
               <a:rPr lang="es-419" smtClean="0"/>
-              <a:t>14/9/2021</a:t>
+              <a:t>16/9/2021</a:t>
             </a:fld>
             <a:endParaRPr lang="es-419"/>
           </a:p>
@@ -2399,7 +2400,7 @@
           <a:p>
             <a:fld id="{0C193083-F695-41A6-A514-C6B01A0DC117}" type="datetimeFigureOut">
               <a:rPr lang="es-419" smtClean="0"/>
-              <a:t>14/9/2021</a:t>
+              <a:t>16/9/2021</a:t>
             </a:fld>
             <a:endParaRPr lang="es-419"/>
           </a:p>
@@ -2688,7 +2689,7 @@
           <a:p>
             <a:fld id="{0C193083-F695-41A6-A514-C6B01A0DC117}" type="datetimeFigureOut">
               <a:rPr lang="es-419" smtClean="0"/>
-              <a:t>14/9/2021</a:t>
+              <a:t>16/9/2021</a:t>
             </a:fld>
             <a:endParaRPr lang="es-419"/>
           </a:p>
@@ -2931,7 +2932,7 @@
           <a:p>
             <a:fld id="{0C193083-F695-41A6-A514-C6B01A0DC117}" type="datetimeFigureOut">
               <a:rPr lang="es-419" smtClean="0"/>
-              <a:t>14/9/2021</a:t>
+              <a:t>16/9/2021</a:t>
             </a:fld>
             <a:endParaRPr lang="es-419"/>
           </a:p>
@@ -5270,6 +5271,583 @@
 </p:sld>
 </file>
 
+<file path=ppt/slides/slide3.xml><?xml version="1.0" encoding="utf-8"?>
+<p:sld xmlns:a="http://schemas.openxmlformats.org/drawingml/2006/main" xmlns:r="http://schemas.openxmlformats.org/officeDocument/2006/relationships" xmlns:p="http://schemas.openxmlformats.org/presentationml/2006/main">
+  <p:cSld>
+    <p:spTree>
+      <p:nvGrpSpPr>
+        <p:cNvPr id="1" name=""/>
+        <p:cNvGrpSpPr/>
+        <p:nvPr/>
+      </p:nvGrpSpPr>
+      <p:grpSpPr>
+        <a:xfrm>
+          <a:off x="0" y="0"/>
+          <a:ext cx="0" cy="0"/>
+          <a:chOff x="0" y="0"/>
+          <a:chExt cx="0" cy="0"/>
+        </a:xfrm>
+      </p:grpSpPr>
+      <p:sp>
+        <p:nvSpPr>
+          <p:cNvPr id="4" name="Rectángulo 3">
+            <a:extLst>
+              <a:ext uri="{FF2B5EF4-FFF2-40B4-BE49-F238E27FC236}">
+                <a16:creationId xmlns:a16="http://schemas.microsoft.com/office/drawing/2014/main" id="{2173E46C-5589-4169-9AE7-A5B87DEB5A25}"/>
+              </a:ext>
+            </a:extLst>
+          </p:cNvPr>
+          <p:cNvSpPr/>
+          <p:nvPr/>
+        </p:nvSpPr>
+        <p:spPr>
+          <a:xfrm>
+            <a:off x="617921" y="410818"/>
+            <a:ext cx="9811540" cy="5352533"/>
+          </a:xfrm>
+          <a:prstGeom prst="rect">
+            <a:avLst/>
+          </a:prstGeom>
+          <a:ln w="28575">
+            <a:solidFill>
+              <a:srgbClr val="C00000"/>
+            </a:solidFill>
+          </a:ln>
+        </p:spPr>
+        <p:style>
+          <a:lnRef idx="2">
+            <a:schemeClr val="accent6"/>
+          </a:lnRef>
+          <a:fillRef idx="1">
+            <a:schemeClr val="lt1"/>
+          </a:fillRef>
+          <a:effectRef idx="0">
+            <a:schemeClr val="accent6"/>
+          </a:effectRef>
+          <a:fontRef idx="minor">
+            <a:schemeClr val="dk1"/>
+          </a:fontRef>
+        </p:style>
+        <p:txBody>
+          <a:bodyPr rtlCol="0" anchor="ctr"/>
+          <a:lstStyle/>
+          <a:p>
+            <a:pPr algn="ctr"/>
+            <a:endParaRPr lang="es-419" dirty="0"/>
+          </a:p>
+        </p:txBody>
+      </p:sp>
+      <p:sp>
+        <p:nvSpPr>
+          <p:cNvPr id="5" name="Rectángulo 4">
+            <a:extLst>
+              <a:ext uri="{FF2B5EF4-FFF2-40B4-BE49-F238E27FC236}">
+                <a16:creationId xmlns:a16="http://schemas.microsoft.com/office/drawing/2014/main" id="{1E42DC07-5CAE-444E-944A-36A26C55E05B}"/>
+              </a:ext>
+            </a:extLst>
+          </p:cNvPr>
+          <p:cNvSpPr/>
+          <p:nvPr/>
+        </p:nvSpPr>
+        <p:spPr>
+          <a:xfrm>
+            <a:off x="800987" y="972688"/>
+            <a:ext cx="4722704" cy="3930616"/>
+          </a:xfrm>
+          <a:prstGeom prst="rect">
+            <a:avLst/>
+          </a:prstGeom>
+          <a:ln w="28575">
+            <a:solidFill>
+              <a:schemeClr val="accent1">
+                <a:lumMod val="50000"/>
+              </a:schemeClr>
+            </a:solidFill>
+          </a:ln>
+        </p:spPr>
+        <p:style>
+          <a:lnRef idx="2">
+            <a:schemeClr val="accent6"/>
+          </a:lnRef>
+          <a:fillRef idx="1">
+            <a:schemeClr val="lt1"/>
+          </a:fillRef>
+          <a:effectRef idx="0">
+            <a:schemeClr val="accent6"/>
+          </a:effectRef>
+          <a:fontRef idx="minor">
+            <a:schemeClr val="dk1"/>
+          </a:fontRef>
+        </p:style>
+        <p:txBody>
+          <a:bodyPr rtlCol="0" anchor="ctr"/>
+          <a:lstStyle/>
+          <a:p>
+            <a:pPr algn="ctr"/>
+            <a:endParaRPr lang="es-419" dirty="0"/>
+          </a:p>
+        </p:txBody>
+      </p:sp>
+      <p:sp>
+        <p:nvSpPr>
+          <p:cNvPr id="6" name="Rectángulo 5">
+            <a:extLst>
+              <a:ext uri="{FF2B5EF4-FFF2-40B4-BE49-F238E27FC236}">
+                <a16:creationId xmlns:a16="http://schemas.microsoft.com/office/drawing/2014/main" id="{D7548C9D-8E10-4FD3-8ADD-6E378C5B969B}"/>
+              </a:ext>
+            </a:extLst>
+          </p:cNvPr>
+          <p:cNvSpPr/>
+          <p:nvPr/>
+        </p:nvSpPr>
+        <p:spPr>
+          <a:xfrm>
+            <a:off x="5523691" y="972688"/>
+            <a:ext cx="4722704" cy="3930616"/>
+          </a:xfrm>
+          <a:prstGeom prst="rect">
+            <a:avLst/>
+          </a:prstGeom>
+          <a:ln w="28575">
+            <a:solidFill>
+              <a:schemeClr val="accent1">
+                <a:lumMod val="50000"/>
+              </a:schemeClr>
+            </a:solidFill>
+          </a:ln>
+        </p:spPr>
+        <p:style>
+          <a:lnRef idx="2">
+            <a:schemeClr val="accent6"/>
+          </a:lnRef>
+          <a:fillRef idx="1">
+            <a:schemeClr val="lt1"/>
+          </a:fillRef>
+          <a:effectRef idx="0">
+            <a:schemeClr val="accent6"/>
+          </a:effectRef>
+          <a:fontRef idx="minor">
+            <a:schemeClr val="dk1"/>
+          </a:fontRef>
+        </p:style>
+        <p:txBody>
+          <a:bodyPr rtlCol="0" anchor="ctr"/>
+          <a:lstStyle/>
+          <a:p>
+            <a:pPr algn="ctr"/>
+            <a:endParaRPr lang="es-419" dirty="0"/>
+          </a:p>
+        </p:txBody>
+      </p:sp>
+      <p:sp>
+        <p:nvSpPr>
+          <p:cNvPr id="7" name="Rectángulo 6">
+            <a:extLst>
+              <a:ext uri="{FF2B5EF4-FFF2-40B4-BE49-F238E27FC236}">
+                <a16:creationId xmlns:a16="http://schemas.microsoft.com/office/drawing/2014/main" id="{8B09984E-7A34-4A9D-BBB4-7C4E0A64C9A5}"/>
+              </a:ext>
+            </a:extLst>
+          </p:cNvPr>
+          <p:cNvSpPr/>
+          <p:nvPr/>
+        </p:nvSpPr>
+        <p:spPr>
+          <a:xfrm>
+            <a:off x="1032244" y="1282148"/>
+            <a:ext cx="4175860" cy="3223591"/>
+          </a:xfrm>
+          <a:prstGeom prst="rect">
+            <a:avLst/>
+          </a:prstGeom>
+          <a:ln w="28575">
+            <a:solidFill>
+              <a:srgbClr val="C00000"/>
+            </a:solidFill>
+          </a:ln>
+        </p:spPr>
+        <p:style>
+          <a:lnRef idx="2">
+            <a:schemeClr val="accent6"/>
+          </a:lnRef>
+          <a:fillRef idx="1">
+            <a:schemeClr val="lt1"/>
+          </a:fillRef>
+          <a:effectRef idx="0">
+            <a:schemeClr val="accent6"/>
+          </a:effectRef>
+          <a:fontRef idx="minor">
+            <a:schemeClr val="dk1"/>
+          </a:fontRef>
+        </p:style>
+        <p:txBody>
+          <a:bodyPr rtlCol="0" anchor="ctr"/>
+          <a:lstStyle/>
+          <a:p>
+            <a:pPr algn="ctr"/>
+            <a:endParaRPr lang="es-419" dirty="0"/>
+          </a:p>
+        </p:txBody>
+      </p:sp>
+      <p:sp>
+        <p:nvSpPr>
+          <p:cNvPr id="8" name="Rectángulo 7">
+            <a:extLst>
+              <a:ext uri="{FF2B5EF4-FFF2-40B4-BE49-F238E27FC236}">
+                <a16:creationId xmlns:a16="http://schemas.microsoft.com/office/drawing/2014/main" id="{04729E9E-599D-4D1D-961E-54759B1D20AC}"/>
+              </a:ext>
+            </a:extLst>
+          </p:cNvPr>
+          <p:cNvSpPr/>
+          <p:nvPr/>
+        </p:nvSpPr>
+        <p:spPr>
+          <a:xfrm>
+            <a:off x="1131636" y="1417983"/>
+            <a:ext cx="3930694" cy="1139687"/>
+          </a:xfrm>
+          <a:prstGeom prst="rect">
+            <a:avLst/>
+          </a:prstGeom>
+          <a:ln w="28575">
+            <a:solidFill>
+              <a:srgbClr val="C00000"/>
+            </a:solidFill>
+          </a:ln>
+        </p:spPr>
+        <p:style>
+          <a:lnRef idx="2">
+            <a:schemeClr val="accent6"/>
+          </a:lnRef>
+          <a:fillRef idx="1">
+            <a:schemeClr val="lt1"/>
+          </a:fillRef>
+          <a:effectRef idx="0">
+            <a:schemeClr val="accent6"/>
+          </a:effectRef>
+          <a:fontRef idx="minor">
+            <a:schemeClr val="dk1"/>
+          </a:fontRef>
+        </p:style>
+        <p:txBody>
+          <a:bodyPr rtlCol="0" anchor="ctr"/>
+          <a:lstStyle/>
+          <a:p>
+            <a:pPr algn="ctr"/>
+            <a:endParaRPr lang="es-419" dirty="0"/>
+          </a:p>
+        </p:txBody>
+      </p:sp>
+      <p:sp>
+        <p:nvSpPr>
+          <p:cNvPr id="9" name="Rectángulo 8">
+            <a:extLst>
+              <a:ext uri="{FF2B5EF4-FFF2-40B4-BE49-F238E27FC236}">
+                <a16:creationId xmlns:a16="http://schemas.microsoft.com/office/drawing/2014/main" id="{9A0F9D3B-9545-4B43-900B-DB12236BF381}"/>
+              </a:ext>
+            </a:extLst>
+          </p:cNvPr>
+          <p:cNvSpPr/>
+          <p:nvPr/>
+        </p:nvSpPr>
+        <p:spPr>
+          <a:xfrm>
+            <a:off x="2563643" y="2004392"/>
+            <a:ext cx="2268142" cy="437322"/>
+          </a:xfrm>
+          <a:prstGeom prst="rect">
+            <a:avLst/>
+          </a:prstGeom>
+          <a:ln w="28575">
+            <a:solidFill>
+              <a:srgbClr val="C00000"/>
+            </a:solidFill>
+          </a:ln>
+        </p:spPr>
+        <p:style>
+          <a:lnRef idx="2">
+            <a:schemeClr val="accent6"/>
+          </a:lnRef>
+          <a:fillRef idx="1">
+            <a:schemeClr val="lt1"/>
+          </a:fillRef>
+          <a:effectRef idx="0">
+            <a:schemeClr val="accent6"/>
+          </a:effectRef>
+          <a:fontRef idx="minor">
+            <a:schemeClr val="dk1"/>
+          </a:fontRef>
+        </p:style>
+        <p:txBody>
+          <a:bodyPr rtlCol="0" anchor="ctr"/>
+          <a:lstStyle/>
+          <a:p>
+            <a:pPr algn="ctr"/>
+            <a:endParaRPr lang="es-419" dirty="0"/>
+          </a:p>
+        </p:txBody>
+      </p:sp>
+      <p:sp>
+        <p:nvSpPr>
+          <p:cNvPr id="10" name="Elipse 9">
+            <a:extLst>
+              <a:ext uri="{FF2B5EF4-FFF2-40B4-BE49-F238E27FC236}">
+                <a16:creationId xmlns:a16="http://schemas.microsoft.com/office/drawing/2014/main" id="{F448EA74-8D5F-4DA6-9EA8-85A709C234A9}"/>
+              </a:ext>
+            </a:extLst>
+          </p:cNvPr>
+          <p:cNvSpPr/>
+          <p:nvPr/>
+        </p:nvSpPr>
+        <p:spPr>
+          <a:xfrm>
+            <a:off x="1277022" y="1461132"/>
+            <a:ext cx="971034" cy="1053387"/>
+          </a:xfrm>
+          <a:prstGeom prst="ellipse">
+            <a:avLst/>
+          </a:prstGeom>
+          <a:ln w="28575">
+            <a:solidFill>
+              <a:srgbClr val="C00000"/>
+            </a:solidFill>
+          </a:ln>
+        </p:spPr>
+        <p:style>
+          <a:lnRef idx="2">
+            <a:schemeClr val="accent6"/>
+          </a:lnRef>
+          <a:fillRef idx="1">
+            <a:schemeClr val="lt1"/>
+          </a:fillRef>
+          <a:effectRef idx="0">
+            <a:schemeClr val="accent6"/>
+          </a:effectRef>
+          <a:fontRef idx="minor">
+            <a:schemeClr val="dk1"/>
+          </a:fontRef>
+        </p:style>
+        <p:txBody>
+          <a:bodyPr rtlCol="0" anchor="ctr"/>
+          <a:lstStyle/>
+          <a:p>
+            <a:pPr algn="ctr"/>
+            <a:r>
+              <a:rPr lang="es-ES" dirty="0"/>
+              <a:t>Foto</a:t>
+            </a:r>
+            <a:endParaRPr lang="es-419" dirty="0"/>
+          </a:p>
+        </p:txBody>
+      </p:sp>
+      <p:sp>
+        <p:nvSpPr>
+          <p:cNvPr id="11" name="Rectángulo 10">
+            <a:extLst>
+              <a:ext uri="{FF2B5EF4-FFF2-40B4-BE49-F238E27FC236}">
+                <a16:creationId xmlns:a16="http://schemas.microsoft.com/office/drawing/2014/main" id="{049C51D2-E6E9-4128-8DCE-2B0ADE1AF27E}"/>
+              </a:ext>
+            </a:extLst>
+          </p:cNvPr>
+          <p:cNvSpPr/>
+          <p:nvPr/>
+        </p:nvSpPr>
+        <p:spPr>
+          <a:xfrm>
+            <a:off x="1131635" y="2682217"/>
+            <a:ext cx="3930693" cy="1618113"/>
+          </a:xfrm>
+          <a:prstGeom prst="rect">
+            <a:avLst/>
+          </a:prstGeom>
+          <a:ln w="28575">
+            <a:solidFill>
+              <a:srgbClr val="C00000"/>
+            </a:solidFill>
+          </a:ln>
+        </p:spPr>
+        <p:style>
+          <a:lnRef idx="2">
+            <a:schemeClr val="accent6"/>
+          </a:lnRef>
+          <a:fillRef idx="1">
+            <a:schemeClr val="lt1"/>
+          </a:fillRef>
+          <a:effectRef idx="0">
+            <a:schemeClr val="accent6"/>
+          </a:effectRef>
+          <a:fontRef idx="minor">
+            <a:schemeClr val="dk1"/>
+          </a:fontRef>
+        </p:style>
+        <p:txBody>
+          <a:bodyPr rtlCol="0" anchor="ctr"/>
+          <a:lstStyle/>
+          <a:p>
+            <a:pPr algn="ctr"/>
+            <a:endParaRPr lang="es-419" dirty="0"/>
+          </a:p>
+        </p:txBody>
+      </p:sp>
+      <p:sp>
+        <p:nvSpPr>
+          <p:cNvPr id="12" name="Rectángulo 11">
+            <a:extLst>
+              <a:ext uri="{FF2B5EF4-FFF2-40B4-BE49-F238E27FC236}">
+                <a16:creationId xmlns:a16="http://schemas.microsoft.com/office/drawing/2014/main" id="{A40F064A-D7BB-4F0B-8247-09AA8D6370A5}"/>
+              </a:ext>
+            </a:extLst>
+          </p:cNvPr>
+          <p:cNvSpPr/>
+          <p:nvPr/>
+        </p:nvSpPr>
+        <p:spPr>
+          <a:xfrm>
+            <a:off x="1323106" y="2796824"/>
+            <a:ext cx="3547750" cy="1023730"/>
+          </a:xfrm>
+          <a:prstGeom prst="rect">
+            <a:avLst/>
+          </a:prstGeom>
+          <a:ln w="28575">
+            <a:solidFill>
+              <a:srgbClr val="C00000"/>
+            </a:solidFill>
+          </a:ln>
+        </p:spPr>
+        <p:style>
+          <a:lnRef idx="2">
+            <a:schemeClr val="accent6"/>
+          </a:lnRef>
+          <a:fillRef idx="1">
+            <a:schemeClr val="lt1"/>
+          </a:fillRef>
+          <a:effectRef idx="0">
+            <a:schemeClr val="accent6"/>
+          </a:effectRef>
+          <a:fontRef idx="minor">
+            <a:schemeClr val="dk1"/>
+          </a:fontRef>
+        </p:style>
+        <p:txBody>
+          <a:bodyPr rtlCol="0" anchor="ctr"/>
+          <a:lstStyle/>
+          <a:p>
+            <a:pPr algn="ctr"/>
+            <a:endParaRPr lang="es-419" dirty="0"/>
+          </a:p>
+        </p:txBody>
+      </p:sp>
+      <p:sp>
+        <p:nvSpPr>
+          <p:cNvPr id="13" name="Rectángulo 12">
+            <a:extLst>
+              <a:ext uri="{FF2B5EF4-FFF2-40B4-BE49-F238E27FC236}">
+                <a16:creationId xmlns:a16="http://schemas.microsoft.com/office/drawing/2014/main" id="{FEC46CFC-501A-4202-8418-27BDB922EAC4}"/>
+              </a:ext>
+            </a:extLst>
+          </p:cNvPr>
+          <p:cNvSpPr/>
+          <p:nvPr/>
+        </p:nvSpPr>
+        <p:spPr>
+          <a:xfrm>
+            <a:off x="1323106" y="3914588"/>
+            <a:ext cx="1466477" cy="288850"/>
+          </a:xfrm>
+          <a:prstGeom prst="rect">
+            <a:avLst/>
+          </a:prstGeom>
+          <a:ln w="28575">
+            <a:solidFill>
+              <a:srgbClr val="C00000"/>
+            </a:solidFill>
+          </a:ln>
+        </p:spPr>
+        <p:style>
+          <a:lnRef idx="2">
+            <a:schemeClr val="accent6"/>
+          </a:lnRef>
+          <a:fillRef idx="1">
+            <a:schemeClr val="lt1"/>
+          </a:fillRef>
+          <a:effectRef idx="0">
+            <a:schemeClr val="accent6"/>
+          </a:effectRef>
+          <a:fontRef idx="minor">
+            <a:schemeClr val="dk1"/>
+          </a:fontRef>
+        </p:style>
+        <p:txBody>
+          <a:bodyPr rtlCol="0" anchor="ctr"/>
+          <a:lstStyle/>
+          <a:p>
+            <a:pPr algn="ctr"/>
+            <a:endParaRPr lang="es-419" dirty="0"/>
+          </a:p>
+        </p:txBody>
+      </p:sp>
+      <p:sp>
+        <p:nvSpPr>
+          <p:cNvPr id="14" name="Rectángulo 13">
+            <a:extLst>
+              <a:ext uri="{FF2B5EF4-FFF2-40B4-BE49-F238E27FC236}">
+                <a16:creationId xmlns:a16="http://schemas.microsoft.com/office/drawing/2014/main" id="{CD2DA236-7ED9-45E4-B929-244197CB3984}"/>
+              </a:ext>
+            </a:extLst>
+          </p:cNvPr>
+          <p:cNvSpPr/>
+          <p:nvPr/>
+        </p:nvSpPr>
+        <p:spPr>
+          <a:xfrm>
+            <a:off x="5707436" y="1283357"/>
+            <a:ext cx="4223372" cy="3222381"/>
+          </a:xfrm>
+          <a:prstGeom prst="rect">
+            <a:avLst/>
+          </a:prstGeom>
+          <a:ln w="28575">
+            <a:solidFill>
+              <a:srgbClr val="C00000"/>
+            </a:solidFill>
+          </a:ln>
+        </p:spPr>
+        <p:style>
+          <a:lnRef idx="2">
+            <a:schemeClr val="accent6"/>
+          </a:lnRef>
+          <a:fillRef idx="1">
+            <a:schemeClr val="lt1"/>
+          </a:fillRef>
+          <a:effectRef idx="0">
+            <a:schemeClr val="accent6"/>
+          </a:effectRef>
+          <a:fontRef idx="minor">
+            <a:schemeClr val="dk1"/>
+          </a:fontRef>
+        </p:style>
+        <p:txBody>
+          <a:bodyPr rtlCol="0" anchor="ctr"/>
+          <a:lstStyle/>
+          <a:p>
+            <a:pPr algn="ctr"/>
+            <a:endParaRPr lang="es-419" dirty="0"/>
+          </a:p>
+        </p:txBody>
+      </p:sp>
+    </p:spTree>
+    <p:extLst>
+      <p:ext uri="{BB962C8B-B14F-4D97-AF65-F5344CB8AC3E}">
+        <p14:creationId xmlns:p14="http://schemas.microsoft.com/office/powerpoint/2010/main" val="3059459719"/>
+      </p:ext>
+    </p:extLst>
+  </p:cSld>
+  <p:clrMapOvr>
+    <a:masterClrMapping/>
+  </p:clrMapOvr>
+</p:sld>
+</file>
+
 <file path=ppt/theme/theme1.xml><?xml version="1.0" encoding="utf-8"?>
 <a:theme xmlns:a="http://schemas.openxmlformats.org/drawingml/2006/main" name="Tema de Office">
   <a:themeElements>

</xml_diff>